<commit_message>
add phone config command added to mqtt portocol
</commit_message>
<xml_diff>
--- a/Structure/Communication Workflow — MQTT Design & Architecture.pptx
+++ b/Structure/Communication Workflow — MQTT Design & Architecture.pptx
@@ -212,7 +212,7 @@
           <a:p>
             <a:fld id="{EBD053AE-A036-45D9-A403-1429BE75DCA0}" type="datetimeFigureOut">
               <a:rPr lang="en-US" smtClean="0"/>
-              <a:t>9/22/2025</a:t>
+              <a:t>10/15/2025</a:t>
             </a:fld>
             <a:endParaRPr lang="en-US"/>
           </a:p>
@@ -710,7 +710,7 @@
           <a:p>
             <a:fld id="{7263C32F-9312-4839-B63E-0DA3845E719F}" type="datetimeFigureOut">
               <a:rPr lang="en-US" smtClean="0"/>
-              <a:t>9/22/2025</a:t>
+              <a:t>10/15/2025</a:t>
             </a:fld>
             <a:endParaRPr lang="en-US"/>
           </a:p>
@@ -908,7 +908,7 @@
           <a:p>
             <a:fld id="{7263C32F-9312-4839-B63E-0DA3845E719F}" type="datetimeFigureOut">
               <a:rPr lang="en-US" smtClean="0"/>
-              <a:t>9/22/2025</a:t>
+              <a:t>10/15/2025</a:t>
             </a:fld>
             <a:endParaRPr lang="en-US"/>
           </a:p>
@@ -1116,7 +1116,7 @@
           <a:p>
             <a:fld id="{7263C32F-9312-4839-B63E-0DA3845E719F}" type="datetimeFigureOut">
               <a:rPr lang="en-US" smtClean="0"/>
-              <a:t>9/22/2025</a:t>
+              <a:t>10/15/2025</a:t>
             </a:fld>
             <a:endParaRPr lang="en-US"/>
           </a:p>
@@ -1314,7 +1314,7 @@
           <a:p>
             <a:fld id="{7263C32F-9312-4839-B63E-0DA3845E719F}" type="datetimeFigureOut">
               <a:rPr lang="en-US" smtClean="0"/>
-              <a:t>9/22/2025</a:t>
+              <a:t>10/15/2025</a:t>
             </a:fld>
             <a:endParaRPr lang="en-US"/>
           </a:p>
@@ -1589,7 +1589,7 @@
           <a:p>
             <a:fld id="{7263C32F-9312-4839-B63E-0DA3845E719F}" type="datetimeFigureOut">
               <a:rPr lang="en-US" smtClean="0"/>
-              <a:t>9/22/2025</a:t>
+              <a:t>10/15/2025</a:t>
             </a:fld>
             <a:endParaRPr lang="en-US"/>
           </a:p>
@@ -1854,7 +1854,7 @@
           <a:p>
             <a:fld id="{7263C32F-9312-4839-B63E-0DA3845E719F}" type="datetimeFigureOut">
               <a:rPr lang="en-US" smtClean="0"/>
-              <a:t>9/22/2025</a:t>
+              <a:t>10/15/2025</a:t>
             </a:fld>
             <a:endParaRPr lang="en-US"/>
           </a:p>
@@ -2266,7 +2266,7 @@
           <a:p>
             <a:fld id="{7263C32F-9312-4839-B63E-0DA3845E719F}" type="datetimeFigureOut">
               <a:rPr lang="en-US" smtClean="0"/>
-              <a:t>9/22/2025</a:t>
+              <a:t>10/15/2025</a:t>
             </a:fld>
             <a:endParaRPr lang="en-US"/>
           </a:p>
@@ -2407,7 +2407,7 @@
           <a:p>
             <a:fld id="{7263C32F-9312-4839-B63E-0DA3845E719F}" type="datetimeFigureOut">
               <a:rPr lang="en-US" smtClean="0"/>
-              <a:t>9/22/2025</a:t>
+              <a:t>10/15/2025</a:t>
             </a:fld>
             <a:endParaRPr lang="en-US"/>
           </a:p>
@@ -2520,7 +2520,7 @@
           <a:p>
             <a:fld id="{7263C32F-9312-4839-B63E-0DA3845E719F}" type="datetimeFigureOut">
               <a:rPr lang="en-US" smtClean="0"/>
-              <a:t>9/22/2025</a:t>
+              <a:t>10/15/2025</a:t>
             </a:fld>
             <a:endParaRPr lang="en-US"/>
           </a:p>
@@ -2831,7 +2831,7 @@
           <a:p>
             <a:fld id="{7263C32F-9312-4839-B63E-0DA3845E719F}" type="datetimeFigureOut">
               <a:rPr lang="en-US" smtClean="0"/>
-              <a:t>9/22/2025</a:t>
+              <a:t>10/15/2025</a:t>
             </a:fld>
             <a:endParaRPr lang="en-US"/>
           </a:p>
@@ -3119,7 +3119,7 @@
           <a:p>
             <a:fld id="{7263C32F-9312-4839-B63E-0DA3845E719F}" type="datetimeFigureOut">
               <a:rPr lang="en-US" smtClean="0"/>
-              <a:t>9/22/2025</a:t>
+              <a:t>10/15/2025</a:t>
             </a:fld>
             <a:endParaRPr lang="en-US"/>
           </a:p>
@@ -3360,7 +3360,7 @@
           <a:p>
             <a:fld id="{7263C32F-9312-4839-B63E-0DA3845E719F}" type="datetimeFigureOut">
               <a:rPr lang="en-US" smtClean="0"/>
-              <a:t>9/22/2025</a:t>
+              <a:t>10/15/2025</a:t>
             </a:fld>
             <a:endParaRPr lang="en-US"/>
           </a:p>
@@ -6209,7 +6209,7 @@
         </p:nvSpPr>
         <p:spPr>
           <a:xfrm>
-            <a:off x="128079" y="1694483"/>
+            <a:off x="119025" y="798190"/>
             <a:ext cx="1050587" cy="478411"/>
           </a:xfrm>
           <a:prstGeom prst="roundRect">
@@ -6260,7 +6260,7 @@
         </p:nvCxnSpPr>
         <p:spPr>
           <a:xfrm flipH="1">
-            <a:off x="1275945" y="1721351"/>
+            <a:off x="1266891" y="825058"/>
             <a:ext cx="165369" cy="424673"/>
           </a:xfrm>
           <a:prstGeom prst="line">
@@ -6296,7 +6296,7 @@
         </p:nvSpPr>
         <p:spPr>
           <a:xfrm>
-            <a:off x="1538593" y="1694483"/>
+            <a:off x="1529539" y="798190"/>
             <a:ext cx="1050587" cy="478411"/>
           </a:xfrm>
           <a:prstGeom prst="roundRect">
@@ -6347,7 +6347,7 @@
         </p:nvCxnSpPr>
         <p:spPr>
           <a:xfrm flipH="1">
-            <a:off x="2686459" y="1721351"/>
+            <a:off x="2677405" y="825058"/>
             <a:ext cx="165369" cy="424673"/>
           </a:xfrm>
           <a:prstGeom prst="line">
@@ -6383,7 +6383,7 @@
         </p:nvSpPr>
         <p:spPr>
           <a:xfrm>
-            <a:off x="2949107" y="1692285"/>
+            <a:off x="2940053" y="795992"/>
             <a:ext cx="1292148" cy="478411"/>
           </a:xfrm>
           <a:prstGeom prst="roundRect">
@@ -6440,7 +6440,7 @@
         </p:nvCxnSpPr>
         <p:spPr>
           <a:xfrm flipH="1">
-            <a:off x="4338534" y="1721351"/>
+            <a:off x="4329480" y="825058"/>
             <a:ext cx="165369" cy="424673"/>
           </a:xfrm>
           <a:prstGeom prst="line">
@@ -6476,7 +6476,7 @@
         </p:nvSpPr>
         <p:spPr>
           <a:xfrm>
-            <a:off x="6155978" y="2109805"/>
+            <a:off x="6146924" y="1213512"/>
             <a:ext cx="1292148" cy="478411"/>
           </a:xfrm>
           <a:prstGeom prst="roundRect">
@@ -6530,7 +6530,7 @@
         </p:nvSpPr>
         <p:spPr>
           <a:xfrm>
-            <a:off x="4601182" y="1700689"/>
+            <a:off x="4592128" y="804396"/>
             <a:ext cx="1292148" cy="478411"/>
           </a:xfrm>
           <a:prstGeom prst="roundRect">
@@ -6566,49 +6566,6 @@
             <a:r>
               <a:rPr lang="en-US" dirty="0"/>
               <a:t>config</a:t>
-            </a:r>
-          </a:p>
-        </p:txBody>
-      </p:sp>
-      <p:sp>
-        <p:nvSpPr>
-          <p:cNvPr id="21" name="TextBox 20">
-            <a:extLst>
-              <a:ext uri="{FF2B5EF4-FFF2-40B4-BE49-F238E27FC236}">
-                <a16:creationId xmlns:a16="http://schemas.microsoft.com/office/drawing/2014/main" id="{F211318E-1B5B-67C8-4528-A0116A291BC3}"/>
-              </a:ext>
-            </a:extLst>
-          </p:cNvPr>
-          <p:cNvSpPr txBox="1"/>
-          <p:nvPr/>
-        </p:nvSpPr>
-        <p:spPr>
-          <a:xfrm>
-            <a:off x="1810693" y="2577357"/>
-            <a:ext cx="1400241" cy="369332"/>
-          </a:xfrm>
-          <a:prstGeom prst="rect">
-            <a:avLst/>
-          </a:prstGeom>
-          <a:noFill/>
-        </p:spPr>
-        <p:txBody>
-          <a:bodyPr wrap="square">
-            <a:spAutoFit/>
-          </a:bodyPr>
-          <a:lstStyle/>
-          <a:p>
-            <a:r>
-              <a:rPr lang="en-US" dirty="0"/>
-              <a:t>“{</a:t>
-            </a:r>
-            <a:r>
-              <a:rPr lang="en-US" dirty="0" err="1"/>
-              <a:t>gyro_off</a:t>
-            </a:r>
-            <a:r>
-              <a:rPr lang="en-US" dirty="0"/>
-              <a:t>}”</a:t>
             </a:r>
           </a:p>
         </p:txBody>
@@ -6683,7 +6640,7 @@
         </p:nvCxnSpPr>
         <p:spPr>
           <a:xfrm flipH="1">
-            <a:off x="5990609" y="1700689"/>
+            <a:off x="5981555" y="804396"/>
             <a:ext cx="165369" cy="424673"/>
           </a:xfrm>
           <a:prstGeom prst="line">
@@ -6719,7 +6676,7 @@
         </p:nvSpPr>
         <p:spPr>
           <a:xfrm>
-            <a:off x="6155978" y="3839831"/>
+            <a:off x="6146924" y="2403259"/>
             <a:ext cx="1292148" cy="478411"/>
           </a:xfrm>
           <a:prstGeom prst="roundRect">
@@ -6774,7 +6731,7 @@
         </p:nvSpPr>
         <p:spPr>
           <a:xfrm>
-            <a:off x="6155978" y="5569857"/>
+            <a:off x="6146924" y="3521573"/>
             <a:ext cx="1292148" cy="478411"/>
           </a:xfrm>
           <a:prstGeom prst="roundRect">
@@ -6828,7 +6785,7 @@
         </p:nvSpPr>
         <p:spPr>
           <a:xfrm>
-            <a:off x="7527260" y="1809117"/>
+            <a:off x="7518206" y="912824"/>
             <a:ext cx="4403446" cy="1010319"/>
           </a:xfrm>
           <a:prstGeom prst="roundRect">
@@ -6882,7 +6839,7 @@
         </p:nvSpPr>
         <p:spPr>
           <a:xfrm>
-            <a:off x="7525950" y="1868972"/>
+            <a:off x="7516896" y="972679"/>
             <a:ext cx="4257458" cy="923330"/>
           </a:xfrm>
           <a:prstGeom prst="rect">
@@ -6929,8 +6886,8 @@
         </p:nvSpPr>
         <p:spPr>
           <a:xfrm>
-            <a:off x="7527260" y="3475696"/>
-            <a:ext cx="4363346" cy="1010319"/>
+            <a:off x="7518206" y="2039124"/>
+            <a:ext cx="4403446" cy="1010319"/>
           </a:xfrm>
           <a:prstGeom prst="roundRect">
             <a:avLst>
@@ -6983,7 +6940,7 @@
         </p:nvSpPr>
         <p:spPr>
           <a:xfrm>
-            <a:off x="7538596" y="3519190"/>
+            <a:off x="7529542" y="2082618"/>
             <a:ext cx="4182406" cy="923330"/>
           </a:xfrm>
           <a:prstGeom prst="rect">
@@ -7030,8 +6987,8 @@
         </p:nvSpPr>
         <p:spPr>
           <a:xfrm>
-            <a:off x="7527260" y="5244813"/>
-            <a:ext cx="4363346" cy="1200329"/>
+            <a:off x="7518206" y="3196529"/>
+            <a:ext cx="4403446" cy="1200329"/>
           </a:xfrm>
           <a:prstGeom prst="roundRect">
             <a:avLst>
@@ -7084,7 +7041,7 @@
         </p:nvSpPr>
         <p:spPr>
           <a:xfrm>
-            <a:off x="7572495" y="5244814"/>
+            <a:off x="7563441" y="3196530"/>
             <a:ext cx="4272876" cy="1200329"/>
           </a:xfrm>
           <a:prstGeom prst="rect">
@@ -7143,10 +7100,10 @@
       </p:sp>
       <p:sp>
         <p:nvSpPr>
-          <p:cNvPr id="30" name="TextBox 29">
-            <a:extLst>
-              <a:ext uri="{FF2B5EF4-FFF2-40B4-BE49-F238E27FC236}">
-                <a16:creationId xmlns:a16="http://schemas.microsoft.com/office/drawing/2014/main" id="{654A9FE4-A9A8-28AA-A545-D8DDEF458DE1}"/>
+          <p:cNvPr id="34" name="TextBox 33">
+            <a:extLst>
+              <a:ext uri="{FF2B5EF4-FFF2-40B4-BE49-F238E27FC236}">
+                <a16:creationId xmlns:a16="http://schemas.microsoft.com/office/drawing/2014/main" id="{598C79F7-C036-A615-F4D6-8C72031F1F51}"/>
               </a:ext>
             </a:extLst>
           </p:cNvPr>
@@ -7155,8 +7112,8 @@
         </p:nvSpPr>
         <p:spPr>
           <a:xfrm>
-            <a:off x="3249072" y="2568636"/>
-            <a:ext cx="2282748" cy="369332"/>
+            <a:off x="3016247" y="3521573"/>
+            <a:ext cx="1575881" cy="369332"/>
           </a:xfrm>
           <a:prstGeom prst="rect">
             <a:avLst/>
@@ -7171,17 +7128,17 @@
           <a:p>
             <a:r>
               <a:rPr lang="en-US" dirty="0"/>
-              <a:t>“{gyro_on_1}”</a:t>
-            </a:r>
-          </a:p>
-        </p:txBody>
-      </p:sp>
-      <p:sp>
-        <p:nvSpPr>
-          <p:cNvPr id="32" name="TextBox 31">
-            <a:extLst>
-              <a:ext uri="{FF2B5EF4-FFF2-40B4-BE49-F238E27FC236}">
-                <a16:creationId xmlns:a16="http://schemas.microsoft.com/office/drawing/2014/main" id="{290F258D-477F-982E-4804-AEE43DE7EC58}"/>
+              <a:t>“{wit_on_60}”</a:t>
+            </a:r>
+          </a:p>
+        </p:txBody>
+      </p:sp>
+      <p:sp>
+        <p:nvSpPr>
+          <p:cNvPr id="36" name="TextBox 35">
+            <a:extLst>
+              <a:ext uri="{FF2B5EF4-FFF2-40B4-BE49-F238E27FC236}">
+                <a16:creationId xmlns:a16="http://schemas.microsoft.com/office/drawing/2014/main" id="{DA20D033-339A-00B0-86A1-D16CFD932D8F}"/>
               </a:ext>
             </a:extLst>
           </p:cNvPr>
@@ -7190,8 +7147,8 @@
         </p:nvSpPr>
         <p:spPr>
           <a:xfrm>
-            <a:off x="2871284" y="4125172"/>
-            <a:ext cx="912776" cy="369332"/>
+            <a:off x="4637363" y="3521573"/>
+            <a:ext cx="1575881" cy="369332"/>
           </a:xfrm>
           <a:prstGeom prst="rect">
             <a:avLst/>
@@ -7206,17 +7163,25 @@
           <a:p>
             <a:r>
               <a:rPr lang="en-US" dirty="0"/>
-              <a:t>“{off}”</a:t>
-            </a:r>
-          </a:p>
-        </p:txBody>
-      </p:sp>
-      <p:sp>
-        <p:nvSpPr>
-          <p:cNvPr id="33" name="TextBox 32">
-            <a:extLst>
-              <a:ext uri="{FF2B5EF4-FFF2-40B4-BE49-F238E27FC236}">
-                <a16:creationId xmlns:a16="http://schemas.microsoft.com/office/drawing/2014/main" id="{05DB71D8-B85C-171E-77A4-1BBB195F4228}"/>
+              <a:t>“{</a:t>
+            </a:r>
+            <a:r>
+              <a:rPr lang="en-US" dirty="0" err="1"/>
+              <a:t>wit_off</a:t>
+            </a:r>
+            <a:r>
+              <a:rPr lang="en-US" dirty="0"/>
+              <a:t>}”</a:t>
+            </a:r>
+          </a:p>
+        </p:txBody>
+      </p:sp>
+      <p:sp>
+        <p:nvSpPr>
+          <p:cNvPr id="37" name="TextBox 36">
+            <a:extLst>
+              <a:ext uri="{FF2B5EF4-FFF2-40B4-BE49-F238E27FC236}">
+                <a16:creationId xmlns:a16="http://schemas.microsoft.com/office/drawing/2014/main" id="{AC32DFD7-2E07-3613-353F-1E40A88AB6E9}"/>
               </a:ext>
             </a:extLst>
           </p:cNvPr>
@@ -7225,8 +7190,8 @@
         </p:nvSpPr>
         <p:spPr>
           <a:xfrm>
-            <a:off x="3591127" y="4133576"/>
-            <a:ext cx="912776" cy="369332"/>
+            <a:off x="1372928" y="3502097"/>
+            <a:ext cx="1738009" cy="369332"/>
           </a:xfrm>
           <a:prstGeom prst="rect">
             <a:avLst/>
@@ -7241,17 +7206,17 @@
           <a:p>
             <a:r>
               <a:rPr lang="en-US" dirty="0"/>
-              <a:t>“{on}”</a:t>
-            </a:r>
-          </a:p>
-        </p:txBody>
-      </p:sp>
-      <p:sp>
-        <p:nvSpPr>
-          <p:cNvPr id="34" name="TextBox 33">
-            <a:extLst>
-              <a:ext uri="{FF2B5EF4-FFF2-40B4-BE49-F238E27FC236}">
-                <a16:creationId xmlns:a16="http://schemas.microsoft.com/office/drawing/2014/main" id="{598C79F7-C036-A615-F4D6-8C72031F1F51}"/>
+              <a:t>“{wit_on_240}”</a:t>
+            </a:r>
+          </a:p>
+        </p:txBody>
+      </p:sp>
+      <p:sp>
+        <p:nvSpPr>
+          <p:cNvPr id="9" name="TextBox 8">
+            <a:extLst>
+              <a:ext uri="{FF2B5EF4-FFF2-40B4-BE49-F238E27FC236}">
+                <a16:creationId xmlns:a16="http://schemas.microsoft.com/office/drawing/2014/main" id="{F211318E-1B5B-67C8-4528-A0116A291BC3}"/>
               </a:ext>
             </a:extLst>
           </p:cNvPr>
@@ -7260,8 +7225,8 @@
         </p:nvSpPr>
         <p:spPr>
           <a:xfrm>
-            <a:off x="2050259" y="5617047"/>
-            <a:ext cx="1575881" cy="369332"/>
+            <a:off x="8999481" y="1222233"/>
+            <a:ext cx="1400241" cy="369332"/>
           </a:xfrm>
           <a:prstGeom prst="rect">
             <a:avLst/>
@@ -7276,17 +7241,25 @@
           <a:p>
             <a:r>
               <a:rPr lang="en-US" dirty="0"/>
-              <a:t>“{wit_on_60}”</a:t>
-            </a:r>
-          </a:p>
-        </p:txBody>
-      </p:sp>
-      <p:sp>
-        <p:nvSpPr>
-          <p:cNvPr id="36" name="TextBox 35">
-            <a:extLst>
-              <a:ext uri="{FF2B5EF4-FFF2-40B4-BE49-F238E27FC236}">
-                <a16:creationId xmlns:a16="http://schemas.microsoft.com/office/drawing/2014/main" id="{DA20D033-339A-00B0-86A1-D16CFD932D8F}"/>
+              <a:t>“{</a:t>
+            </a:r>
+            <a:r>
+              <a:rPr lang="en-US" dirty="0" err="1"/>
+              <a:t>gyro_off</a:t>
+            </a:r>
+            <a:r>
+              <a:rPr lang="en-US" dirty="0"/>
+              <a:t>}”</a:t>
+            </a:r>
+          </a:p>
+        </p:txBody>
+      </p:sp>
+      <p:sp>
+        <p:nvSpPr>
+          <p:cNvPr id="13" name="TextBox 12">
+            <a:extLst>
+              <a:ext uri="{FF2B5EF4-FFF2-40B4-BE49-F238E27FC236}">
+                <a16:creationId xmlns:a16="http://schemas.microsoft.com/office/drawing/2014/main" id="{654A9FE4-A9A8-28AA-A545-D8DDEF458DE1}"/>
               </a:ext>
             </a:extLst>
           </p:cNvPr>
@@ -7295,8 +7268,8 @@
         </p:nvSpPr>
         <p:spPr>
           <a:xfrm>
-            <a:off x="3671375" y="5617047"/>
-            <a:ext cx="1575881" cy="369332"/>
+            <a:off x="10437860" y="1213512"/>
+            <a:ext cx="2282748" cy="369332"/>
           </a:xfrm>
           <a:prstGeom prst="rect">
             <a:avLst/>
@@ -7311,25 +7284,17 @@
           <a:p>
             <a:r>
               <a:rPr lang="en-US" dirty="0"/>
-              <a:t>“{</a:t>
-            </a:r>
-            <a:r>
-              <a:rPr lang="en-US" dirty="0" err="1"/>
-              <a:t>wit_off</a:t>
-            </a:r>
-            <a:r>
-              <a:rPr lang="en-US" dirty="0"/>
-              <a:t>}”</a:t>
-            </a:r>
-          </a:p>
-        </p:txBody>
-      </p:sp>
-      <p:sp>
-        <p:nvSpPr>
-          <p:cNvPr id="37" name="TextBox 36">
-            <a:extLst>
-              <a:ext uri="{FF2B5EF4-FFF2-40B4-BE49-F238E27FC236}">
-                <a16:creationId xmlns:a16="http://schemas.microsoft.com/office/drawing/2014/main" id="{AC32DFD7-2E07-3613-353F-1E40A88AB6E9}"/>
+              <a:t>“{gyro_on_1}”</a:t>
+            </a:r>
+          </a:p>
+        </p:txBody>
+      </p:sp>
+      <p:sp>
+        <p:nvSpPr>
+          <p:cNvPr id="14" name="TextBox 13">
+            <a:extLst>
+              <a:ext uri="{FF2B5EF4-FFF2-40B4-BE49-F238E27FC236}">
+                <a16:creationId xmlns:a16="http://schemas.microsoft.com/office/drawing/2014/main" id="{290F258D-477F-982E-4804-AEE43DE7EC58}"/>
               </a:ext>
             </a:extLst>
           </p:cNvPr>
@@ -7338,8 +7303,8 @@
         </p:nvSpPr>
         <p:spPr>
           <a:xfrm>
-            <a:off x="406940" y="5597571"/>
-            <a:ext cx="1738009" cy="369332"/>
+            <a:off x="9795757" y="2384713"/>
+            <a:ext cx="912776" cy="369332"/>
           </a:xfrm>
           <a:prstGeom prst="rect">
             <a:avLst/>
@@ -7354,7 +7319,238 @@
           <a:p>
             <a:r>
               <a:rPr lang="en-US" dirty="0"/>
-              <a:t>“{wit_on_240}”</a:t>
+              <a:t>“{off}”</a:t>
+            </a:r>
+          </a:p>
+        </p:txBody>
+      </p:sp>
+      <p:sp>
+        <p:nvSpPr>
+          <p:cNvPr id="15" name="TextBox 14">
+            <a:extLst>
+              <a:ext uri="{FF2B5EF4-FFF2-40B4-BE49-F238E27FC236}">
+                <a16:creationId xmlns:a16="http://schemas.microsoft.com/office/drawing/2014/main" id="{05DB71D8-B85C-171E-77A4-1BBB195F4228}"/>
+              </a:ext>
+            </a:extLst>
+          </p:cNvPr>
+          <p:cNvSpPr txBox="1"/>
+          <p:nvPr/>
+        </p:nvSpPr>
+        <p:spPr>
+          <a:xfrm>
+            <a:off x="10515600" y="2393117"/>
+            <a:ext cx="912776" cy="369332"/>
+          </a:xfrm>
+          <a:prstGeom prst="rect">
+            <a:avLst/>
+          </a:prstGeom>
+          <a:noFill/>
+        </p:spPr>
+        <p:txBody>
+          <a:bodyPr wrap="square">
+            <a:spAutoFit/>
+          </a:bodyPr>
+          <a:lstStyle/>
+          <a:p>
+            <a:r>
+              <a:rPr lang="en-US" dirty="0"/>
+              <a:t>“{on}”</a:t>
+            </a:r>
+          </a:p>
+        </p:txBody>
+      </p:sp>
+      <p:sp>
+        <p:nvSpPr>
+          <p:cNvPr id="16" name="Rectangle: Rounded Corners 15">
+            <a:extLst>
+              <a:ext uri="{FF2B5EF4-FFF2-40B4-BE49-F238E27FC236}">
+                <a16:creationId xmlns:a16="http://schemas.microsoft.com/office/drawing/2014/main" id="{6E7B1DBB-1894-8CD4-AF59-24513F09BCA6}"/>
+              </a:ext>
+            </a:extLst>
+          </p:cNvPr>
+          <p:cNvSpPr/>
+          <p:nvPr/>
+        </p:nvSpPr>
+        <p:spPr>
+          <a:xfrm>
+            <a:off x="5676523" y="4868987"/>
+            <a:ext cx="1762549" cy="478411"/>
+          </a:xfrm>
+          <a:prstGeom prst="roundRect">
+            <a:avLst/>
+          </a:prstGeom>
+          <a:solidFill>
+            <a:schemeClr val="accent2">
+              <a:lumMod val="75000"/>
+            </a:schemeClr>
+          </a:solidFill>
+        </p:spPr>
+        <p:style>
+          <a:lnRef idx="2">
+            <a:schemeClr val="accent1">
+              <a:shade val="15000"/>
+            </a:schemeClr>
+          </a:lnRef>
+          <a:fillRef idx="1">
+            <a:schemeClr val="accent1"/>
+          </a:fillRef>
+          <a:effectRef idx="0">
+            <a:schemeClr val="accent1"/>
+          </a:effectRef>
+          <a:fontRef idx="minor">
+            <a:schemeClr val="lt1"/>
+          </a:fontRef>
+        </p:style>
+        <p:txBody>
+          <a:bodyPr rtlCol="0" anchor="ctr"/>
+          <a:lstStyle/>
+          <a:p>
+            <a:pPr algn="ctr"/>
+            <a:r>
+              <a:rPr lang="en-US" dirty="0" err="1"/>
+              <a:t>phone_number</a:t>
+            </a:r>
+            <a:endParaRPr lang="en-US" dirty="0"/>
+          </a:p>
+        </p:txBody>
+      </p:sp>
+      <p:sp>
+        <p:nvSpPr>
+          <p:cNvPr id="17" name="Rectangle: Rounded Corners 16">
+            <a:extLst>
+              <a:ext uri="{FF2B5EF4-FFF2-40B4-BE49-F238E27FC236}">
+                <a16:creationId xmlns:a16="http://schemas.microsoft.com/office/drawing/2014/main" id="{C61DE1DB-FD54-AD07-2D35-C05BB333EABA}"/>
+              </a:ext>
+            </a:extLst>
+          </p:cNvPr>
+          <p:cNvSpPr/>
+          <p:nvPr/>
+        </p:nvSpPr>
+        <p:spPr>
+          <a:xfrm>
+            <a:off x="7518206" y="4543943"/>
+            <a:ext cx="4403446" cy="1200329"/>
+          </a:xfrm>
+          <a:prstGeom prst="roundRect">
+            <a:avLst>
+              <a:gd name="adj" fmla="val 2832"/>
+            </a:avLst>
+          </a:prstGeom>
+          <a:solidFill>
+            <a:schemeClr val="tx2">
+              <a:lumMod val="25000"/>
+              <a:lumOff val="75000"/>
+            </a:schemeClr>
+          </a:solidFill>
+        </p:spPr>
+        <p:style>
+          <a:lnRef idx="2">
+            <a:schemeClr val="accent1">
+              <a:shade val="15000"/>
+            </a:schemeClr>
+          </a:lnRef>
+          <a:fillRef idx="1">
+            <a:schemeClr val="accent1"/>
+          </a:fillRef>
+          <a:effectRef idx="0">
+            <a:schemeClr val="accent1"/>
+          </a:effectRef>
+          <a:fontRef idx="minor">
+            <a:schemeClr val="lt1"/>
+          </a:fontRef>
+        </p:style>
+        <p:txBody>
+          <a:bodyPr rtlCol="0" anchor="ctr"/>
+          <a:lstStyle/>
+          <a:p>
+            <a:pPr algn="ctr"/>
+            <a:endParaRPr lang="en-US"/>
+          </a:p>
+        </p:txBody>
+      </p:sp>
+      <p:sp>
+        <p:nvSpPr>
+          <p:cNvPr id="19" name="TextBox 18">
+            <a:extLst>
+              <a:ext uri="{FF2B5EF4-FFF2-40B4-BE49-F238E27FC236}">
+                <a16:creationId xmlns:a16="http://schemas.microsoft.com/office/drawing/2014/main" id="{D928B3AF-D9C5-BE79-9BBD-BBD59345CF10}"/>
+              </a:ext>
+            </a:extLst>
+          </p:cNvPr>
+          <p:cNvSpPr txBox="1"/>
+          <p:nvPr/>
+        </p:nvSpPr>
+        <p:spPr>
+          <a:xfrm>
+            <a:off x="7563441" y="4543944"/>
+            <a:ext cx="4272876" cy="923330"/>
+          </a:xfrm>
+          <a:prstGeom prst="rect">
+            <a:avLst/>
+          </a:prstGeom>
+          <a:noFill/>
+        </p:spPr>
+        <p:txBody>
+          <a:bodyPr wrap="square" rtlCol="0">
+            <a:spAutoFit/>
+          </a:bodyPr>
+          <a:lstStyle/>
+          <a:p>
+            <a:r>
+              <a:rPr lang="en-US" dirty="0"/>
+              <a:t>{</a:t>
+            </a:r>
+          </a:p>
+          <a:p>
+            <a:r>
+              <a:rPr lang="en-US" dirty="0"/>
+              <a:t>   </a:t>
+            </a:r>
+            <a:r>
+              <a:rPr lang="en-US" dirty="0" err="1"/>
+              <a:t>phone_number</a:t>
+            </a:r>
+            <a:endParaRPr lang="en-US" dirty="0"/>
+          </a:p>
+          <a:p>
+            <a:r>
+              <a:rPr lang="en-US" dirty="0"/>
+              <a:t>}</a:t>
+            </a:r>
+          </a:p>
+        </p:txBody>
+      </p:sp>
+      <p:sp>
+        <p:nvSpPr>
+          <p:cNvPr id="22" name="TextBox 21">
+            <a:extLst>
+              <a:ext uri="{FF2B5EF4-FFF2-40B4-BE49-F238E27FC236}">
+                <a16:creationId xmlns:a16="http://schemas.microsoft.com/office/drawing/2014/main" id="{61EB1936-9C31-D4D7-5926-58C4DDC983E2}"/>
+              </a:ext>
+            </a:extLst>
+          </p:cNvPr>
+          <p:cNvSpPr txBox="1"/>
+          <p:nvPr/>
+        </p:nvSpPr>
+        <p:spPr>
+          <a:xfrm>
+            <a:off x="2836913" y="4923526"/>
+            <a:ext cx="2754275" cy="369332"/>
+          </a:xfrm>
+          <a:prstGeom prst="rect">
+            <a:avLst/>
+          </a:prstGeom>
+          <a:noFill/>
+        </p:spPr>
+        <p:txBody>
+          <a:bodyPr wrap="square">
+            <a:spAutoFit/>
+          </a:bodyPr>
+          <a:lstStyle/>
+          <a:p>
+            <a:r>
+              <a:rPr lang="en-US" dirty="0"/>
+              <a:t>“{add_+989126891656}”</a:t>
             </a:r>
           </a:p>
         </p:txBody>

</xml_diff>

<commit_message>
new msg structure for status
</commit_message>
<xml_diff>
--- a/Structure/Communication Workflow — MQTT Design & Architecture.pptx
+++ b/Structure/Communication Workflow — MQTT Design & Architecture.pptx
@@ -212,7 +212,7 @@
           <a:p>
             <a:fld id="{EBD053AE-A036-45D9-A403-1429BE75DCA0}" type="datetimeFigureOut">
               <a:rPr lang="en-US" smtClean="0"/>
-              <a:t>10/15/2025</a:t>
+              <a:t>10/19/2025</a:t>
             </a:fld>
             <a:endParaRPr lang="en-US"/>
           </a:p>
@@ -710,7 +710,7 @@
           <a:p>
             <a:fld id="{7263C32F-9312-4839-B63E-0DA3845E719F}" type="datetimeFigureOut">
               <a:rPr lang="en-US" smtClean="0"/>
-              <a:t>10/15/2025</a:t>
+              <a:t>10/19/2025</a:t>
             </a:fld>
             <a:endParaRPr lang="en-US"/>
           </a:p>
@@ -908,7 +908,7 @@
           <a:p>
             <a:fld id="{7263C32F-9312-4839-B63E-0DA3845E719F}" type="datetimeFigureOut">
               <a:rPr lang="en-US" smtClean="0"/>
-              <a:t>10/15/2025</a:t>
+              <a:t>10/19/2025</a:t>
             </a:fld>
             <a:endParaRPr lang="en-US"/>
           </a:p>
@@ -1116,7 +1116,7 @@
           <a:p>
             <a:fld id="{7263C32F-9312-4839-B63E-0DA3845E719F}" type="datetimeFigureOut">
               <a:rPr lang="en-US" smtClean="0"/>
-              <a:t>10/15/2025</a:t>
+              <a:t>10/19/2025</a:t>
             </a:fld>
             <a:endParaRPr lang="en-US"/>
           </a:p>
@@ -1314,7 +1314,7 @@
           <a:p>
             <a:fld id="{7263C32F-9312-4839-B63E-0DA3845E719F}" type="datetimeFigureOut">
               <a:rPr lang="en-US" smtClean="0"/>
-              <a:t>10/15/2025</a:t>
+              <a:t>10/19/2025</a:t>
             </a:fld>
             <a:endParaRPr lang="en-US"/>
           </a:p>
@@ -1589,7 +1589,7 @@
           <a:p>
             <a:fld id="{7263C32F-9312-4839-B63E-0DA3845E719F}" type="datetimeFigureOut">
               <a:rPr lang="en-US" smtClean="0"/>
-              <a:t>10/15/2025</a:t>
+              <a:t>10/19/2025</a:t>
             </a:fld>
             <a:endParaRPr lang="en-US"/>
           </a:p>
@@ -1854,7 +1854,7 @@
           <a:p>
             <a:fld id="{7263C32F-9312-4839-B63E-0DA3845E719F}" type="datetimeFigureOut">
               <a:rPr lang="en-US" smtClean="0"/>
-              <a:t>10/15/2025</a:t>
+              <a:t>10/19/2025</a:t>
             </a:fld>
             <a:endParaRPr lang="en-US"/>
           </a:p>
@@ -2266,7 +2266,7 @@
           <a:p>
             <a:fld id="{7263C32F-9312-4839-B63E-0DA3845E719F}" type="datetimeFigureOut">
               <a:rPr lang="en-US" smtClean="0"/>
-              <a:t>10/15/2025</a:t>
+              <a:t>10/19/2025</a:t>
             </a:fld>
             <a:endParaRPr lang="en-US"/>
           </a:p>
@@ -2407,7 +2407,7 @@
           <a:p>
             <a:fld id="{7263C32F-9312-4839-B63E-0DA3845E719F}" type="datetimeFigureOut">
               <a:rPr lang="en-US" smtClean="0"/>
-              <a:t>10/15/2025</a:t>
+              <a:t>10/19/2025</a:t>
             </a:fld>
             <a:endParaRPr lang="en-US"/>
           </a:p>
@@ -2520,7 +2520,7 @@
           <a:p>
             <a:fld id="{7263C32F-9312-4839-B63E-0DA3845E719F}" type="datetimeFigureOut">
               <a:rPr lang="en-US" smtClean="0"/>
-              <a:t>10/15/2025</a:t>
+              <a:t>10/19/2025</a:t>
             </a:fld>
             <a:endParaRPr lang="en-US"/>
           </a:p>
@@ -2831,7 +2831,7 @@
           <a:p>
             <a:fld id="{7263C32F-9312-4839-B63E-0DA3845E719F}" type="datetimeFigureOut">
               <a:rPr lang="en-US" smtClean="0"/>
-              <a:t>10/15/2025</a:t>
+              <a:t>10/19/2025</a:t>
             </a:fld>
             <a:endParaRPr lang="en-US"/>
           </a:p>
@@ -3119,7 +3119,7 @@
           <a:p>
             <a:fld id="{7263C32F-9312-4839-B63E-0DA3845E719F}" type="datetimeFigureOut">
               <a:rPr lang="en-US" smtClean="0"/>
-              <a:t>10/15/2025</a:t>
+              <a:t>10/19/2025</a:t>
             </a:fld>
             <a:endParaRPr lang="en-US"/>
           </a:p>
@@ -3360,7 +3360,7 @@
           <a:p>
             <a:fld id="{7263C32F-9312-4839-B63E-0DA3845E719F}" type="datetimeFigureOut">
               <a:rPr lang="en-US" smtClean="0"/>
-              <a:t>10/15/2025</a:t>
+              <a:t>10/19/2025</a:t>
             </a:fld>
             <a:endParaRPr lang="en-US"/>
           </a:p>
@@ -16363,8 +16363,8 @@
         </p:nvSpPr>
         <p:spPr>
           <a:xfrm>
-            <a:off x="4922199" y="230555"/>
-            <a:ext cx="7269801" cy="5539978"/>
+            <a:off x="4671459" y="328280"/>
+            <a:ext cx="7269801" cy="5232202"/>
           </a:xfrm>
           <a:prstGeom prst="rect">
             <a:avLst/>
@@ -16378,68 +16378,56 @@
           <a:lstStyle/>
           <a:p>
             <a:r>
-              <a:rPr lang="en-US" dirty="0"/>
+              <a:rPr lang="en-US" sz="1600" dirty="0"/>
               <a:t>{</a:t>
             </a:r>
           </a:p>
           <a:p>
             <a:r>
-              <a:rPr lang="en-US" dirty="0"/>
+              <a:rPr lang="en-US" sz="1600" dirty="0"/>
               <a:t>"time": “</a:t>
             </a:r>
             <a:r>
-              <a:rPr lang="en-US" dirty="0" err="1"/>
+              <a:rPr lang="en-US" sz="1600" dirty="0" err="1"/>
               <a:t>hour,minute,seccond</a:t>
             </a:r>
             <a:r>
-              <a:rPr lang="en-US" dirty="0"/>
+              <a:rPr lang="en-US" sz="1600" dirty="0"/>
               <a:t>",</a:t>
             </a:r>
           </a:p>
           <a:p>
             <a:r>
-              <a:rPr lang="en-US" dirty="0"/>
+              <a:rPr lang="en-US" sz="1600" dirty="0"/>
               <a:t>"</a:t>
             </a:r>
             <a:r>
-              <a:rPr lang="en-US" dirty="0" err="1"/>
+              <a:rPr lang="en-US" sz="1600" dirty="0" err="1"/>
               <a:t>lat</a:t>
             </a:r>
             <a:r>
-              <a:rPr lang="en-US" dirty="0"/>
+              <a:rPr lang="en-US" sz="1600" dirty="0"/>
               <a:t>": 52.520008,</a:t>
             </a:r>
           </a:p>
           <a:p>
             <a:r>
-              <a:rPr lang="en-US" dirty="0"/>
+              <a:rPr lang="en-US" sz="1600" dirty="0"/>
               <a:t>"</a:t>
             </a:r>
             <a:r>
-              <a:rPr lang="en-US" dirty="0" err="1"/>
+              <a:rPr lang="en-US" sz="1600" dirty="0" err="1"/>
               <a:t>lon</a:t>
             </a:r>
             <a:r>
-              <a:rPr lang="en-US" dirty="0"/>
+              <a:rPr lang="en-US" sz="1600" dirty="0"/>
               <a:t>": 13.404954,</a:t>
             </a:r>
           </a:p>
           <a:p>
             <a:r>
-              <a:rPr lang="en-US" dirty="0"/>
+              <a:rPr lang="en-US" sz="1600" dirty="0"/>
               <a:t>“</a:t>
-            </a:r>
-            <a:r>
-              <a:rPr lang="en-US" dirty="0" err="1"/>
-              <a:t>gps</a:t>
-            </a:r>
-            <a:r>
-              <a:rPr lang="en-US" dirty="0"/>
-              <a:t> source”: </a:t>
-            </a:r>
-            <a:r>
-              <a:rPr lang="en-US" sz="1600" dirty="0"/>
-              <a:t>G/B which determines if the data comes from device </a:t>
             </a:r>
             <a:r>
               <a:rPr lang="en-US" sz="1600" dirty="0" err="1"/>
@@ -16447,106 +16435,138 @@
             </a:r>
             <a:r>
               <a:rPr lang="en-US" sz="1600" dirty="0"/>
+              <a:t> source”: </a:t>
+            </a:r>
+            <a:r>
+              <a:rPr lang="en-US" sz="1400" dirty="0"/>
+              <a:t>G/B which determines if the data comes from device </a:t>
+            </a:r>
+            <a:r>
+              <a:rPr lang="en-US" sz="1400" dirty="0" err="1"/>
+              <a:t>gps</a:t>
+            </a:r>
+            <a:r>
+              <a:rPr lang="en-US" sz="1400" dirty="0"/>
               <a:t> or the   	           nearest BTS</a:t>
             </a:r>
           </a:p>
           <a:p>
             <a:r>
-              <a:rPr lang="en-US" dirty="0"/>
+              <a:rPr lang="en-US" sz="1600" dirty="0"/>
               <a:t>“GPS distances traveled”: </a:t>
             </a:r>
             <a:r>
+              <a:rPr lang="en-US" sz="1400" dirty="0"/>
+              <a:t>a float with one floating point digit in kilometers   </a:t>
+            </a:r>
+          </a:p>
+          <a:p>
+            <a:r>
               <a:rPr lang="en-US" sz="1600" dirty="0"/>
-              <a:t>a float with one floating point digit in kilometers   </a:t>
-            </a:r>
-          </a:p>
-          <a:p>
-            <a:r>
-              <a:rPr lang="en-US" dirty="0"/>
               <a:t>“total traveled”: </a:t>
             </a:r>
             <a:r>
+              <a:rPr lang="en-US" sz="1400" dirty="0"/>
+              <a:t>an int to show total traveled distance in meters</a:t>
+            </a:r>
+          </a:p>
+          <a:p>
+            <a:r>
+              <a:rPr lang="en-US" sz="1400" dirty="0"/>
+              <a:t>“Speed”: the speed that comes from </a:t>
+            </a:r>
+            <a:r>
+              <a:rPr lang="en-US" sz="1400" dirty="0" err="1"/>
+              <a:t>gps</a:t>
+            </a:r>
+            <a:r>
+              <a:rPr lang="en-US" sz="1400" dirty="0"/>
+              <a:t>, a float number with two floating point  	number </a:t>
+            </a:r>
+          </a:p>
+          <a:p>
+            <a:r>
               <a:rPr lang="en-US" sz="1600" dirty="0"/>
-              <a:t>an int to show total traveled distance in meters</a:t>
+              <a:t>"battery " : 0-9,   </a:t>
+            </a:r>
+            <a:r>
+              <a:rPr lang="en-US" sz="1400" dirty="0"/>
+              <a:t>  // 9 -&gt; means 90% to 100%, 5 means 50% to 60%</a:t>
             </a:r>
           </a:p>
           <a:p>
             <a:r>
               <a:rPr lang="en-US" sz="1600" dirty="0"/>
-              <a:t>“Speed”: the speed that comes from </a:t>
+              <a:t>" lock status" :   L/U  //lock/unlock</a:t>
+            </a:r>
+          </a:p>
+          <a:p>
+            <a:r>
+              <a:rPr lang="en-US" sz="1600" dirty="0"/>
+              <a:t>" temperature " : 27 //temperature based on Celsius </a:t>
+            </a:r>
+          </a:p>
+          <a:p>
+            <a:r>
+              <a:rPr lang="en-US" sz="1600" dirty="0"/>
+              <a:t>"</a:t>
             </a:r>
             <a:r>
               <a:rPr lang="en-US" sz="1600" dirty="0" err="1"/>
-              <a:t>gps</a:t>
+              <a:t>rssi</a:t>
             </a:r>
             <a:r>
               <a:rPr lang="en-US" sz="1600" dirty="0"/>
-              <a:t>, a float number with two floating point  	number </a:t>
-            </a:r>
-          </a:p>
-          <a:p>
-            <a:r>
-              <a:rPr lang="en-US" dirty="0"/>
-              <a:t>"battery " : 0-9,   </a:t>
-            </a:r>
+              <a:t>": -78,      // optional but useful for diagnostics 	</a:t>
+            </a:r>
+          </a:p>
+          <a:p>
             <a:r>
               <a:rPr lang="en-US" sz="1600" dirty="0"/>
-              <a:t>  // 9 -&gt; means 90% to 100%, 5 means 50% to 60%</a:t>
-            </a:r>
-          </a:p>
-          <a:p>
-            <a:r>
-              <a:rPr lang="en-US" dirty="0"/>
-              <a:t>" lock status" :   L/U  //lock/unlock</a:t>
-            </a:r>
-          </a:p>
-          <a:p>
-            <a:r>
-              <a:rPr lang="en-US" dirty="0"/>
-              <a:t>" temperature " : 27 //temperature based on Celsius </a:t>
-            </a:r>
-          </a:p>
-          <a:p>
-            <a:r>
-              <a:rPr lang="en-US" dirty="0"/>
-              <a:t>"</a:t>
-            </a:r>
-            <a:r>
-              <a:rPr lang="en-US" dirty="0" err="1"/>
-              <a:t>rssi</a:t>
-            </a:r>
-            <a:r>
-              <a:rPr lang="en-US" dirty="0"/>
-              <a:t>": -78,      // optional but useful for diagnostics 	</a:t>
-            </a:r>
-          </a:p>
-          <a:p>
-            <a:r>
-              <a:rPr lang="en-US" dirty="0"/>
               <a:t>" counter": 7      // the Nth transmission</a:t>
             </a:r>
           </a:p>
           <a:p>
             <a:r>
-              <a:rPr lang="en-US" dirty="0"/>
+              <a:rPr lang="en-US" sz="1600" dirty="0"/>
               <a:t>" is queued ": 0/1 // is msg queued or not</a:t>
             </a:r>
           </a:p>
           <a:p>
             <a:r>
-              <a:rPr lang="en-US" dirty="0"/>
+              <a:rPr lang="en-US" sz="1600" dirty="0"/>
               <a:t>“is in geo-fence” Y/N determines if the device is in geo-fence or not</a:t>
             </a:r>
           </a:p>
           <a:p>
             <a:r>
-              <a:rPr lang="en-US" dirty="0"/>
+              <a:rPr lang="en-US" sz="1600" dirty="0"/>
               <a:t>“distance from geo-fence”: distance in meter from geo-fence</a:t>
             </a:r>
           </a:p>
           <a:p>
             <a:r>
-              <a:rPr lang="en-US" dirty="0"/>
+              <a:rPr lang="en-US" sz="1600" dirty="0" err="1"/>
+              <a:t>SpoffingDetected</a:t>
+            </a:r>
+            <a:r>
+              <a:rPr lang="en-US" sz="1600" dirty="0"/>
+              <a:t>: ‘S’, ‘V’</a:t>
+            </a:r>
+          </a:p>
+          <a:p>
+            <a:r>
+              <a:rPr lang="en-US" sz="1600" dirty="0" err="1"/>
+              <a:t>JammingDetected</a:t>
+            </a:r>
+            <a:r>
+              <a:rPr lang="en-US" sz="1600" dirty="0"/>
+              <a:t>: ‘J’, ‘V’</a:t>
+            </a:r>
+          </a:p>
+          <a:p>
+            <a:r>
+              <a:rPr lang="en-US" sz="1600" dirty="0"/>
               <a:t>}</a:t>
             </a:r>
           </a:p>
@@ -16570,14 +16590,14 @@
           <p:nvPr>
             <p:extLst>
               <p:ext uri="{D42A27DB-BD31-4B8C-83A1-F6EECF244321}">
-                <p14:modId xmlns:p14="http://schemas.microsoft.com/office/powerpoint/2010/main" val="109298739"/>
+                <p14:modId xmlns:p14="http://schemas.microsoft.com/office/powerpoint/2010/main" val="2769316957"/>
               </p:ext>
             </p:extLst>
           </p:nvPr>
         </p:nvGraphicFramePr>
         <p:xfrm>
-          <a:off x="102606" y="5955327"/>
-          <a:ext cx="11986785" cy="782320"/>
+          <a:off x="165370" y="5829749"/>
+          <a:ext cx="11659759" cy="822960"/>
         </p:xfrm>
         <a:graphic>
           <a:graphicData uri="http://schemas.openxmlformats.org/drawingml/2006/table">
@@ -16586,122 +16606,136 @@
                 <a:tableStyleId>{5C22544A-7EE6-4342-B048-85BDC9FD1C3A}</a:tableStyleId>
               </a:tblPr>
               <a:tblGrid>
-                <a:gridCol w="424513">
+                <a:gridCol w="385637">
                   <a:extLst>
                     <a:ext uri="{9D8B030D-6E8A-4147-A177-3AD203B41FA5}">
                       <a16:colId xmlns:a16="http://schemas.microsoft.com/office/drawing/2014/main" val="3580210574"/>
                     </a:ext>
                   </a:extLst>
                 </a:gridCol>
-                <a:gridCol w="557219">
+                <a:gridCol w="506190">
                   <a:extLst>
                     <a:ext uri="{9D8B030D-6E8A-4147-A177-3AD203B41FA5}">
                       <a16:colId xmlns:a16="http://schemas.microsoft.com/office/drawing/2014/main" val="2308363581"/>
                     </a:ext>
                   </a:extLst>
                 </a:gridCol>
-                <a:gridCol w="504979">
+                <a:gridCol w="458734">
                   <a:extLst>
                     <a:ext uri="{9D8B030D-6E8A-4147-A177-3AD203B41FA5}">
                       <a16:colId xmlns:a16="http://schemas.microsoft.com/office/drawing/2014/main" val="3586960103"/>
                     </a:ext>
                   </a:extLst>
                 </a:gridCol>
-                <a:gridCol w="888067">
+                <a:gridCol w="429635">
                   <a:extLst>
                     <a:ext uri="{9D8B030D-6E8A-4147-A177-3AD203B41FA5}">
                       <a16:colId xmlns:a16="http://schemas.microsoft.com/office/drawing/2014/main" val="3559934566"/>
                     </a:ext>
                   </a:extLst>
                 </a:gridCol>
-                <a:gridCol w="783588">
+                <a:gridCol w="459515">
                   <a:extLst>
                     <a:ext uri="{9D8B030D-6E8A-4147-A177-3AD203B41FA5}">
                       <a16:colId xmlns:a16="http://schemas.microsoft.com/office/drawing/2014/main" val="278545149"/>
                     </a:ext>
                   </a:extLst>
                 </a:gridCol>
-                <a:gridCol w="783588">
+                <a:gridCol w="717498">
                   <a:extLst>
                     <a:ext uri="{9D8B030D-6E8A-4147-A177-3AD203B41FA5}">
                       <a16:colId xmlns:a16="http://schemas.microsoft.com/office/drawing/2014/main" val="1641939668"/>
                     </a:ext>
                   </a:extLst>
                 </a:gridCol>
-                <a:gridCol w="953986">
+                <a:gridCol w="583659">
                   <a:extLst>
                     <a:ext uri="{9D8B030D-6E8A-4147-A177-3AD203B41FA5}">
                       <a16:colId xmlns:a16="http://schemas.microsoft.com/office/drawing/2014/main" val="3106671423"/>
                     </a:ext>
                   </a:extLst>
                 </a:gridCol>
-                <a:gridCol w="1266180">
+                <a:gridCol w="1001949">
                   <a:extLst>
                     <a:ext uri="{9D8B030D-6E8A-4147-A177-3AD203B41FA5}">
                       <a16:colId xmlns:a16="http://schemas.microsoft.com/office/drawing/2014/main" val="242359884"/>
                     </a:ext>
                   </a:extLst>
                 </a:gridCol>
-                <a:gridCol w="579694">
+                <a:gridCol w="525294">
                   <a:extLst>
                     <a:ext uri="{9D8B030D-6E8A-4147-A177-3AD203B41FA5}">
                       <a16:colId xmlns:a16="http://schemas.microsoft.com/office/drawing/2014/main" val="2220023129"/>
                     </a:ext>
                   </a:extLst>
                 </a:gridCol>
-                <a:gridCol w="506994">
+                <a:gridCol w="447472">
                   <a:extLst>
                     <a:ext uri="{9D8B030D-6E8A-4147-A177-3AD203B41FA5}">
                       <a16:colId xmlns:a16="http://schemas.microsoft.com/office/drawing/2014/main" val="1173540988"/>
                     </a:ext>
                   </a:extLst>
                 </a:gridCol>
-                <a:gridCol w="536779">
+                <a:gridCol w="535021">
                   <a:extLst>
                     <a:ext uri="{9D8B030D-6E8A-4147-A177-3AD203B41FA5}">
                       <a16:colId xmlns:a16="http://schemas.microsoft.com/office/drawing/2014/main" val="1588589816"/>
                     </a:ext>
                   </a:extLst>
                 </a:gridCol>
-                <a:gridCol w="579621">
+                <a:gridCol w="564205">
                   <a:extLst>
                     <a:ext uri="{9D8B030D-6E8A-4147-A177-3AD203B41FA5}">
                       <a16:colId xmlns:a16="http://schemas.microsoft.com/office/drawing/2014/main" val="2155768377"/>
                     </a:ext>
                   </a:extLst>
                 </a:gridCol>
-                <a:gridCol w="626161">
+                <a:gridCol w="486383">
                   <a:extLst>
                     <a:ext uri="{9D8B030D-6E8A-4147-A177-3AD203B41FA5}">
                       <a16:colId xmlns:a16="http://schemas.microsoft.com/office/drawing/2014/main" val="403237501"/>
                     </a:ext>
                   </a:extLst>
                 </a:gridCol>
-                <a:gridCol w="457431">
+                <a:gridCol w="544749">
                   <a:extLst>
                     <a:ext uri="{9D8B030D-6E8A-4147-A177-3AD203B41FA5}">
                       <a16:colId xmlns:a16="http://schemas.microsoft.com/office/drawing/2014/main" val="1227616705"/>
                     </a:ext>
                   </a:extLst>
                 </a:gridCol>
-                <a:gridCol w="733331">
+                <a:gridCol w="671208">
                   <a:extLst>
                     <a:ext uri="{9D8B030D-6E8A-4147-A177-3AD203B41FA5}">
                       <a16:colId xmlns:a16="http://schemas.microsoft.com/office/drawing/2014/main" val="2669153585"/>
                     </a:ext>
                   </a:extLst>
                 </a:gridCol>
-                <a:gridCol w="651849">
+                <a:gridCol w="729575">
                   <a:extLst>
                     <a:ext uri="{9D8B030D-6E8A-4147-A177-3AD203B41FA5}">
                       <a16:colId xmlns:a16="http://schemas.microsoft.com/office/drawing/2014/main" val="2980439808"/>
                     </a:ext>
                   </a:extLst>
                 </a:gridCol>
-                <a:gridCol w="1152805">
+                <a:gridCol w="904672">
                   <a:extLst>
                     <a:ext uri="{9D8B030D-6E8A-4147-A177-3AD203B41FA5}">
                       <a16:colId xmlns:a16="http://schemas.microsoft.com/office/drawing/2014/main" val="2356622058"/>
+                    </a:ext>
+                  </a:extLst>
+                </a:gridCol>
+                <a:gridCol w="826851">
+                  <a:extLst>
+                    <a:ext uri="{9D8B030D-6E8A-4147-A177-3AD203B41FA5}">
+                      <a16:colId xmlns:a16="http://schemas.microsoft.com/office/drawing/2014/main" val="3999461844"/>
+                    </a:ext>
+                  </a:extLst>
+                </a:gridCol>
+                <a:gridCol w="881512">
+                  <a:extLst>
+                    <a:ext uri="{9D8B030D-6E8A-4147-A177-3AD203B41FA5}">
+                      <a16:colId xmlns:a16="http://schemas.microsoft.com/office/drawing/2014/main" val="1318008227"/>
                     </a:ext>
                   </a:extLst>
                 </a:gridCol>
@@ -16933,6 +16967,32 @@
                   </a:txBody>
                   <a:tcPr/>
                 </a:tc>
+                <a:tc>
+                  <a:txBody>
+                    <a:bodyPr/>
+                    <a:lstStyle/>
+                    <a:p>
+                      <a:r>
+                        <a:rPr lang="en-US" sz="1050" dirty="0"/>
+                        <a:t>Spoofing</a:t>
+                      </a:r>
+                    </a:p>
+                  </a:txBody>
+                  <a:tcPr/>
+                </a:tc>
+                <a:tc>
+                  <a:txBody>
+                    <a:bodyPr/>
+                    <a:lstStyle/>
+                    <a:p>
+                      <a:r>
+                        <a:rPr lang="en-US" sz="1050" dirty="0"/>
+                        <a:t>Jamming</a:t>
+                      </a:r>
+                    </a:p>
+                  </a:txBody>
+                  <a:tcPr/>
+                </a:tc>
                 <a:extLst>
                   <a:ext uri="{0D108BD9-81ED-4DB2-BD59-A6C34878D82A}">
                     <a16:rowId xmlns:a16="http://schemas.microsoft.com/office/drawing/2014/main" val="1200153999"/>
@@ -16986,7 +17046,7 @@
                     <a:p>
                       <a:r>
                         <a:rPr lang="en-US" sz="1050" dirty="0"/>
-                        <a:t>52.520008</a:t>
+                        <a:t>52.5</a:t>
                       </a:r>
                     </a:p>
                   </a:txBody>
@@ -16999,7 +17059,7 @@
                     <a:p>
                       <a:r>
                         <a:rPr lang="en-US" sz="1050" dirty="0"/>
-                        <a:t>13.40495</a:t>
+                        <a:t>13.4</a:t>
                       </a:r>
                     </a:p>
                   </a:txBody>
@@ -17156,6 +17216,32 @@
                       <a:r>
                         <a:rPr lang="en-US" sz="1050" dirty="0"/>
                         <a:t>50000</a:t>
+                      </a:r>
+                    </a:p>
+                  </a:txBody>
+                  <a:tcPr/>
+                </a:tc>
+                <a:tc>
+                  <a:txBody>
+                    <a:bodyPr/>
+                    <a:lstStyle/>
+                    <a:p>
+                      <a:r>
+                        <a:rPr lang="en-US" sz="1050" dirty="0"/>
+                        <a:t>S</a:t>
+                      </a:r>
+                    </a:p>
+                  </a:txBody>
+                  <a:tcPr/>
+                </a:tc>
+                <a:tc>
+                  <a:txBody>
+                    <a:bodyPr/>
+                    <a:lstStyle/>
+                    <a:p>
+                      <a:r>
+                        <a:rPr lang="en-US" sz="1050" dirty="0"/>
+                        <a:t>J</a:t>
                       </a:r>
                     </a:p>
                   </a:txBody>

</xml_diff>